<commit_message>
Favorites in sidebar (index) + updated PSD and presentation
</commit_message>
<xml_diff>
--- a/presentation/iRail-final.pptx
+++ b/presentation/iRail-final.pptx
@@ -9,11 +9,12 @@
     <p:sldId id="257" r:id="rId3"/>
     <p:sldId id="259" r:id="rId4"/>
     <p:sldId id="263" r:id="rId5"/>
-    <p:sldId id="268" r:id="rId6"/>
-    <p:sldId id="264" r:id="rId7"/>
-    <p:sldId id="269" r:id="rId8"/>
-    <p:sldId id="265" r:id="rId9"/>
-    <p:sldId id="267" r:id="rId10"/>
+    <p:sldId id="270" r:id="rId6"/>
+    <p:sldId id="268" r:id="rId7"/>
+    <p:sldId id="264" r:id="rId8"/>
+    <p:sldId id="269" r:id="rId9"/>
+    <p:sldId id="265" r:id="rId10"/>
+    <p:sldId id="267" r:id="rId11"/>
   </p:sldIdLst>
   <p:sldSz cx="9144000" cy="5143500" type="screen16x9"/>
   <p:notesSz cx="6858000" cy="9144000"/>
@@ -296,7 +297,7 @@
           <a:p>
             <a:fld id="{E7C86848-63DA-2549-B754-8F8F7A5000F7}" type="datetimeFigureOut">
               <a:rPr lang="en-US" smtClean="0"/>
-              <a:t>17/07/13</a:t>
+              <a:t>18/07/13</a:t>
             </a:fld>
             <a:endParaRPr lang="en-US"/>
           </a:p>
@@ -466,7 +467,7 @@
           <a:p>
             <a:fld id="{E7C86848-63DA-2549-B754-8F8F7A5000F7}" type="datetimeFigureOut">
               <a:rPr lang="en-US" smtClean="0"/>
-              <a:t>17/07/13</a:t>
+              <a:t>18/07/13</a:t>
             </a:fld>
             <a:endParaRPr lang="en-US"/>
           </a:p>
@@ -646,7 +647,7 @@
           <a:p>
             <a:fld id="{E7C86848-63DA-2549-B754-8F8F7A5000F7}" type="datetimeFigureOut">
               <a:rPr lang="en-US" smtClean="0"/>
-              <a:t>17/07/13</a:t>
+              <a:t>18/07/13</a:t>
             </a:fld>
             <a:endParaRPr lang="en-US"/>
           </a:p>
@@ -816,7 +817,7 @@
           <a:p>
             <a:fld id="{E7C86848-63DA-2549-B754-8F8F7A5000F7}" type="datetimeFigureOut">
               <a:rPr lang="en-US" smtClean="0"/>
-              <a:t>17/07/13</a:t>
+              <a:t>18/07/13</a:t>
             </a:fld>
             <a:endParaRPr lang="en-US"/>
           </a:p>
@@ -1062,7 +1063,7 @@
           <a:p>
             <a:fld id="{E7C86848-63DA-2549-B754-8F8F7A5000F7}" type="datetimeFigureOut">
               <a:rPr lang="en-US" smtClean="0"/>
-              <a:t>17/07/13</a:t>
+              <a:t>18/07/13</a:t>
             </a:fld>
             <a:endParaRPr lang="en-US"/>
           </a:p>
@@ -1350,7 +1351,7 @@
           <a:p>
             <a:fld id="{E7C86848-63DA-2549-B754-8F8F7A5000F7}" type="datetimeFigureOut">
               <a:rPr lang="en-US" smtClean="0"/>
-              <a:t>17/07/13</a:t>
+              <a:t>18/07/13</a:t>
             </a:fld>
             <a:endParaRPr lang="en-US"/>
           </a:p>
@@ -1777,7 +1778,7 @@
           <a:p>
             <a:fld id="{E7C86848-63DA-2549-B754-8F8F7A5000F7}" type="datetimeFigureOut">
               <a:rPr lang="en-US" smtClean="0"/>
-              <a:t>17/07/13</a:t>
+              <a:t>18/07/13</a:t>
             </a:fld>
             <a:endParaRPr lang="en-US"/>
           </a:p>
@@ -1895,7 +1896,7 @@
           <a:p>
             <a:fld id="{E7C86848-63DA-2549-B754-8F8F7A5000F7}" type="datetimeFigureOut">
               <a:rPr lang="en-US" smtClean="0"/>
-              <a:t>17/07/13</a:t>
+              <a:t>18/07/13</a:t>
             </a:fld>
             <a:endParaRPr lang="en-US"/>
           </a:p>
@@ -1990,7 +1991,7 @@
           <a:p>
             <a:fld id="{E7C86848-63DA-2549-B754-8F8F7A5000F7}" type="datetimeFigureOut">
               <a:rPr lang="en-US" smtClean="0"/>
-              <a:t>17/07/13</a:t>
+              <a:t>18/07/13</a:t>
             </a:fld>
             <a:endParaRPr lang="en-US"/>
           </a:p>
@@ -2267,7 +2268,7 @@
           <a:p>
             <a:fld id="{E7C86848-63DA-2549-B754-8F8F7A5000F7}" type="datetimeFigureOut">
               <a:rPr lang="en-US" smtClean="0"/>
-              <a:t>17/07/13</a:t>
+              <a:t>18/07/13</a:t>
             </a:fld>
             <a:endParaRPr lang="en-US"/>
           </a:p>
@@ -2520,7 +2521,7 @@
           <a:p>
             <a:fld id="{E7C86848-63DA-2549-B754-8F8F7A5000F7}" type="datetimeFigureOut">
               <a:rPr lang="en-US" smtClean="0"/>
-              <a:t>17/07/13</a:t>
+              <a:t>18/07/13</a:t>
             </a:fld>
             <a:endParaRPr lang="en-US"/>
           </a:p>
@@ -2738,7 +2739,7 @@
           <a:p>
             <a:fld id="{E7C86848-63DA-2549-B754-8F8F7A5000F7}" type="datetimeFigureOut">
               <a:rPr lang="en-US" smtClean="0"/>
-              <a:t>17/07/13</a:t>
+              <a:t>18/07/13</a:t>
             </a:fld>
             <a:endParaRPr lang="en-US"/>
           </a:p>
@@ -3163,6 +3164,73 @@
 </p:sld>
 </file>
 
+<file path=ppt/slides/slide10.xml><?xml version="1.0" encoding="utf-8"?>
+<p:sld xmlns:a="http://schemas.openxmlformats.org/drawingml/2006/main" xmlns:r="http://schemas.openxmlformats.org/officeDocument/2006/relationships" xmlns:p="http://schemas.openxmlformats.org/presentationml/2006/main">
+  <p:cSld>
+    <p:spTree>
+      <p:nvGrpSpPr>
+        <p:cNvPr id="1" name=""/>
+        <p:cNvGrpSpPr/>
+        <p:nvPr/>
+      </p:nvGrpSpPr>
+      <p:grpSpPr>
+        <a:xfrm>
+          <a:off x="0" y="0"/>
+          <a:ext cx="0" cy="0"/>
+          <a:chOff x="0" y="0"/>
+          <a:chExt cx="0" cy="0"/>
+        </a:xfrm>
+      </p:grpSpPr>
+      <p:pic>
+        <p:nvPicPr>
+          <p:cNvPr id="4" name="Picture 3" descr="1.jpg"/>
+          <p:cNvPicPr>
+            <a:picLocks noChangeAspect="1"/>
+          </p:cNvPicPr>
+          <p:nvPr/>
+        </p:nvPicPr>
+        <p:blipFill>
+          <a:blip r:embed="rId2">
+            <a:extLst>
+              <a:ext uri="{28A0092B-C50C-407E-A947-70E740481C1C}">
+                <a14:useLocalDpi xmlns:a14="http://schemas.microsoft.com/office/drawing/2010/main" val="0"/>
+              </a:ext>
+            </a:extLst>
+          </a:blip>
+          <a:stretch>
+            <a:fillRect/>
+          </a:stretch>
+        </p:blipFill>
+        <p:spPr>
+          <a:xfrm>
+            <a:off x="0" y="0"/>
+            <a:ext cx="9144000" cy="5143500"/>
+          </a:xfrm>
+          <a:prstGeom prst="rect">
+            <a:avLst/>
+          </a:prstGeom>
+        </p:spPr>
+      </p:pic>
+    </p:spTree>
+    <p:extLst>
+      <p:ext uri="{BB962C8B-B14F-4D97-AF65-F5344CB8AC3E}">
+        <p14:creationId xmlns:p14="http://schemas.microsoft.com/office/powerpoint/2010/main" val="1656853097"/>
+      </p:ext>
+    </p:extLst>
+  </p:cSld>
+  <p:clrMapOvr>
+    <a:masterClrMapping/>
+  </p:clrMapOvr>
+  <p:timing>
+    <p:tnLst>
+      <p:par>
+        <p:cTn xmlns:p14="http://schemas.microsoft.com/office/powerpoint/2010/main" id="1" dur="indefinite" restart="never" nodeType="tmRoot"/>
+      </p:par>
+    </p:tnLst>
+  </p:timing>
+</p:sld>
+</file>
+
 <file path=ppt/slides/slide2.xml><?xml version="1.0" encoding="utf-8"?>
 <p:sld xmlns:a="http://schemas.openxmlformats.org/drawingml/2006/main" xmlns:r="http://schemas.openxmlformats.org/officeDocument/2006/relationships" xmlns:p="http://schemas.openxmlformats.org/presentationml/2006/main">
   <p:cSld>
@@ -3417,6 +3485,99 @@
 </file>
 
 <file path=ppt/slides/slide5.xml><?xml version="1.0" encoding="utf-8"?>
+<p:sld xmlns:a="http://schemas.openxmlformats.org/drawingml/2006/main" xmlns:r="http://schemas.openxmlformats.org/officeDocument/2006/relationships" xmlns:p="http://schemas.openxmlformats.org/presentationml/2006/main">
+  <p:cSld>
+    <p:spTree>
+      <p:nvGrpSpPr>
+        <p:cNvPr id="1" name=""/>
+        <p:cNvGrpSpPr/>
+        <p:nvPr/>
+      </p:nvGrpSpPr>
+      <p:grpSpPr>
+        <a:xfrm>
+          <a:off x="0" y="0"/>
+          <a:ext cx="0" cy="0"/>
+          <a:chOff x="0" y="0"/>
+          <a:chExt cx="0" cy="0"/>
+        </a:xfrm>
+      </p:grpSpPr>
+      <p:sp>
+        <p:nvSpPr>
+          <p:cNvPr id="5" name="TextBox 4"/>
+          <p:cNvSpPr txBox="1"/>
+          <p:nvPr/>
+        </p:nvSpPr>
+        <p:spPr>
+          <a:xfrm>
+            <a:off x="2934138" y="2102069"/>
+            <a:ext cx="184666" cy="369332"/>
+          </a:xfrm>
+          <a:prstGeom prst="rect">
+            <a:avLst/>
+          </a:prstGeom>
+          <a:noFill/>
+        </p:spPr>
+        <p:txBody>
+          <a:bodyPr wrap="none" rtlCol="0">
+            <a:spAutoFit/>
+          </a:bodyPr>
+          <a:lstStyle/>
+          <a:p>
+            <a:endParaRPr lang="en-US" dirty="0"/>
+          </a:p>
+        </p:txBody>
+      </p:sp>
+      <p:pic>
+        <p:nvPicPr>
+          <p:cNvPr id="3" name="Picture 2"/>
+          <p:cNvPicPr>
+            <a:picLocks noChangeAspect="1"/>
+          </p:cNvPicPr>
+          <p:nvPr/>
+        </p:nvPicPr>
+        <p:blipFill>
+          <a:blip r:embed="rId2">
+            <a:extLst>
+              <a:ext uri="{28A0092B-C50C-407E-A947-70E740481C1C}">
+                <a14:useLocalDpi xmlns:a14="http://schemas.microsoft.com/office/drawing/2010/main" val="0"/>
+              </a:ext>
+            </a:extLst>
+          </a:blip>
+          <a:stretch>
+            <a:fillRect/>
+          </a:stretch>
+        </p:blipFill>
+        <p:spPr>
+          <a:xfrm>
+            <a:off x="711200" y="0"/>
+            <a:ext cx="7715250" cy="5143500"/>
+          </a:xfrm>
+          <a:prstGeom prst="rect">
+            <a:avLst/>
+          </a:prstGeom>
+        </p:spPr>
+      </p:pic>
+    </p:spTree>
+    <p:extLst>
+      <p:ext uri="{BB962C8B-B14F-4D97-AF65-F5344CB8AC3E}">
+        <p14:creationId xmlns:p14="http://schemas.microsoft.com/office/powerpoint/2010/main" val="3951885892"/>
+      </p:ext>
+    </p:extLst>
+  </p:cSld>
+  <p:clrMapOvr>
+    <a:masterClrMapping/>
+  </p:clrMapOvr>
+  <p:timing>
+    <p:tnLst>
+      <p:par>
+        <p:cTn xmlns:p14="http://schemas.microsoft.com/office/powerpoint/2010/main" id="1" dur="indefinite" restart="never" nodeType="tmRoot"/>
+      </p:par>
+    </p:tnLst>
+  </p:timing>
+</p:sld>
+</file>
+
+<file path=ppt/slides/slide6.xml><?xml version="1.0" encoding="utf-8"?>
 <p:sld xmlns:a="http://schemas.openxmlformats.org/drawingml/2006/main" xmlns:r="http://schemas.openxmlformats.org/officeDocument/2006/relationships" xmlns:p="http://schemas.openxmlformats.org/presentationml/2006/main">
   <p:cSld>
     <p:spTree>
@@ -3513,7 +3674,7 @@
 </p:sld>
 </file>
 
-<file path=ppt/slides/slide6.xml><?xml version="1.0" encoding="utf-8"?>
+<file path=ppt/slides/slide7.xml><?xml version="1.0" encoding="utf-8"?>
 <p:sld xmlns:a="http://schemas.openxmlformats.org/drawingml/2006/main" xmlns:r="http://schemas.openxmlformats.org/officeDocument/2006/relationships" xmlns:p="http://schemas.openxmlformats.org/presentationml/2006/main">
   <p:cSld>
     <p:spTree>
@@ -3606,7 +3767,7 @@
 </p:sld>
 </file>
 
-<file path=ppt/slides/slide7.xml><?xml version="1.0" encoding="utf-8"?>
+<file path=ppt/slides/slide8.xml><?xml version="1.0" encoding="utf-8"?>
 <p:sld xmlns:a="http://schemas.openxmlformats.org/drawingml/2006/main" xmlns:r="http://schemas.openxmlformats.org/officeDocument/2006/relationships" xmlns:p="http://schemas.openxmlformats.org/presentationml/2006/main">
   <p:cSld>
     <p:spTree>
@@ -3673,7 +3834,7 @@
 </p:sld>
 </file>
 
-<file path=ppt/slides/slide8.xml><?xml version="1.0" encoding="utf-8"?>
+<file path=ppt/slides/slide9.xml><?xml version="1.0" encoding="utf-8"?>
 <p:sld xmlns:a="http://schemas.openxmlformats.org/drawingml/2006/main" xmlns:r="http://schemas.openxmlformats.org/officeDocument/2006/relationships" xmlns:p="http://schemas.openxmlformats.org/presentationml/2006/main">
   <p:cSld>
     <p:spTree>
@@ -3750,73 +3911,6 @@
     <p:extLst>
       <p:ext uri="{BB962C8B-B14F-4D97-AF65-F5344CB8AC3E}">
         <p14:creationId xmlns:p14="http://schemas.microsoft.com/office/powerpoint/2010/main" val="2595303245"/>
-      </p:ext>
-    </p:extLst>
-  </p:cSld>
-  <p:clrMapOvr>
-    <a:masterClrMapping/>
-  </p:clrMapOvr>
-  <p:timing>
-    <p:tnLst>
-      <p:par>
-        <p:cTn xmlns:p14="http://schemas.microsoft.com/office/powerpoint/2010/main" id="1" dur="indefinite" restart="never" nodeType="tmRoot"/>
-      </p:par>
-    </p:tnLst>
-  </p:timing>
-</p:sld>
-</file>
-
-<file path=ppt/slides/slide9.xml><?xml version="1.0" encoding="utf-8"?>
-<p:sld xmlns:a="http://schemas.openxmlformats.org/drawingml/2006/main" xmlns:r="http://schemas.openxmlformats.org/officeDocument/2006/relationships" xmlns:p="http://schemas.openxmlformats.org/presentationml/2006/main">
-  <p:cSld>
-    <p:spTree>
-      <p:nvGrpSpPr>
-        <p:cNvPr id="1" name=""/>
-        <p:cNvGrpSpPr/>
-        <p:nvPr/>
-      </p:nvGrpSpPr>
-      <p:grpSpPr>
-        <a:xfrm>
-          <a:off x="0" y="0"/>
-          <a:ext cx="0" cy="0"/>
-          <a:chOff x="0" y="0"/>
-          <a:chExt cx="0" cy="0"/>
-        </a:xfrm>
-      </p:grpSpPr>
-      <p:pic>
-        <p:nvPicPr>
-          <p:cNvPr id="4" name="Picture 3" descr="1.jpg"/>
-          <p:cNvPicPr>
-            <a:picLocks noChangeAspect="1"/>
-          </p:cNvPicPr>
-          <p:nvPr/>
-        </p:nvPicPr>
-        <p:blipFill>
-          <a:blip r:embed="rId2">
-            <a:extLst>
-              <a:ext uri="{28A0092B-C50C-407E-A947-70E740481C1C}">
-                <a14:useLocalDpi xmlns:a14="http://schemas.microsoft.com/office/drawing/2010/main" val="0"/>
-              </a:ext>
-            </a:extLst>
-          </a:blip>
-          <a:stretch>
-            <a:fillRect/>
-          </a:stretch>
-        </p:blipFill>
-        <p:spPr>
-          <a:xfrm>
-            <a:off x="0" y="0"/>
-            <a:ext cx="9144000" cy="5143500"/>
-          </a:xfrm>
-          <a:prstGeom prst="rect">
-            <a:avLst/>
-          </a:prstGeom>
-        </p:spPr>
-      </p:pic>
-    </p:spTree>
-    <p:extLst>
-      <p:ext uri="{BB962C8B-B14F-4D97-AF65-F5344CB8AC3E}">
-        <p14:creationId xmlns:p14="http://schemas.microsoft.com/office/powerpoint/2010/main" val="1656853097"/>
       </p:ext>
     </p:extLst>
   </p:cSld>

</xml_diff>

<commit_message>
Added new MyRail functionality mock-up + added to presentation
</commit_message>
<xml_diff>
--- a/presentation/iRail-final.pptx
+++ b/presentation/iRail-final.pptx
@@ -14,7 +14,8 @@
     <p:sldId id="264" r:id="rId8"/>
     <p:sldId id="269" r:id="rId9"/>
     <p:sldId id="265" r:id="rId10"/>
-    <p:sldId id="267" r:id="rId11"/>
+    <p:sldId id="271" r:id="rId11"/>
+    <p:sldId id="267" r:id="rId12"/>
   </p:sldIdLst>
   <p:sldSz cx="9144000" cy="5143500" type="screen16x9"/>
   <p:notesSz cx="6858000" cy="9144000"/>
@@ -3165,6 +3166,99 @@
 </file>
 
 <file path=ppt/slides/slide10.xml><?xml version="1.0" encoding="utf-8"?>
+<p:sld xmlns:a="http://schemas.openxmlformats.org/drawingml/2006/main" xmlns:r="http://schemas.openxmlformats.org/officeDocument/2006/relationships" xmlns:p="http://schemas.openxmlformats.org/presentationml/2006/main">
+  <p:cSld>
+    <p:spTree>
+      <p:nvGrpSpPr>
+        <p:cNvPr id="1" name=""/>
+        <p:cNvGrpSpPr/>
+        <p:nvPr/>
+      </p:nvGrpSpPr>
+      <p:grpSpPr>
+        <a:xfrm>
+          <a:off x="0" y="0"/>
+          <a:ext cx="0" cy="0"/>
+          <a:chOff x="0" y="0"/>
+          <a:chExt cx="0" cy="0"/>
+        </a:xfrm>
+      </p:grpSpPr>
+      <p:sp>
+        <p:nvSpPr>
+          <p:cNvPr id="5" name="TextBox 4"/>
+          <p:cNvSpPr txBox="1"/>
+          <p:nvPr/>
+        </p:nvSpPr>
+        <p:spPr>
+          <a:xfrm>
+            <a:off x="2934138" y="2102069"/>
+            <a:ext cx="184666" cy="369332"/>
+          </a:xfrm>
+          <a:prstGeom prst="rect">
+            <a:avLst/>
+          </a:prstGeom>
+          <a:noFill/>
+        </p:spPr>
+        <p:txBody>
+          <a:bodyPr wrap="none" rtlCol="0">
+            <a:spAutoFit/>
+          </a:bodyPr>
+          <a:lstStyle/>
+          <a:p>
+            <a:endParaRPr lang="en-US" dirty="0"/>
+          </a:p>
+        </p:txBody>
+      </p:sp>
+      <p:pic>
+        <p:nvPicPr>
+          <p:cNvPr id="3" name="Picture 2"/>
+          <p:cNvPicPr>
+            <a:picLocks noChangeAspect="1"/>
+          </p:cNvPicPr>
+          <p:nvPr/>
+        </p:nvPicPr>
+        <p:blipFill>
+          <a:blip r:embed="rId2">
+            <a:extLst>
+              <a:ext uri="{28A0092B-C50C-407E-A947-70E740481C1C}">
+                <a14:useLocalDpi xmlns:a14="http://schemas.microsoft.com/office/drawing/2010/main" val="0"/>
+              </a:ext>
+            </a:extLst>
+          </a:blip>
+          <a:stretch>
+            <a:fillRect/>
+          </a:stretch>
+        </p:blipFill>
+        <p:spPr>
+          <a:xfrm>
+            <a:off x="1139825" y="0"/>
+            <a:ext cx="6858000" cy="5143500"/>
+          </a:xfrm>
+          <a:prstGeom prst="rect">
+            <a:avLst/>
+          </a:prstGeom>
+        </p:spPr>
+      </p:pic>
+    </p:spTree>
+    <p:extLst>
+      <p:ext uri="{BB962C8B-B14F-4D97-AF65-F5344CB8AC3E}">
+        <p14:creationId xmlns:p14="http://schemas.microsoft.com/office/powerpoint/2010/main" val="4059436173"/>
+      </p:ext>
+    </p:extLst>
+  </p:cSld>
+  <p:clrMapOvr>
+    <a:masterClrMapping/>
+  </p:clrMapOvr>
+  <p:timing>
+    <p:tnLst>
+      <p:par>
+        <p:cTn xmlns:p14="http://schemas.microsoft.com/office/powerpoint/2010/main" id="1" dur="indefinite" restart="never" nodeType="tmRoot"/>
+      </p:par>
+    </p:tnLst>
+  </p:timing>
+</p:sld>
+</file>
+
+<file path=ppt/slides/slide11.xml><?xml version="1.0" encoding="utf-8"?>
 <p:sld xmlns:a="http://schemas.openxmlformats.org/drawingml/2006/main" xmlns:r="http://schemas.openxmlformats.org/officeDocument/2006/relationships" xmlns:p="http://schemas.openxmlformats.org/presentationml/2006/main">
   <p:cSld>
     <p:spTree>

</xml_diff>